<commit_message>
Updates to all slides and images
</commit_message>
<xml_diff>
--- a/Presentation1.pptx
+++ b/Presentation1.pptx
@@ -5,7 +5,7 @@
     <p:sldMasterId id="2147483648" r:id="rId1"/>
   </p:sldMasterIdLst>
   <p:sldIdLst>
-    <p:sldId id="257" r:id="rId2"/>
+    <p:sldId id="267" r:id="rId2"/>
     <p:sldId id="256" r:id="rId3"/>
     <p:sldId id="258" r:id="rId4"/>
     <p:sldId id="259" r:id="rId5"/>
@@ -114,6 +114,11 @@
       </a:defRPr>
     </a:lvl9pPr>
   </p:defaultTextStyle>
+  <p:extLst>
+    <p:ext uri="{EFAFB233-063F-42B5-8137-9DF3F51BA10A}">
+      <p15:sldGuideLst xmlns:p15="http://schemas.microsoft.com/office/powerpoint/2012/main"/>
+    </p:ext>
+  </p:extLst>
 </p:presentation>
 </file>
 
@@ -266,7 +271,7 @@
           <a:p>
             <a:fld id="{22633246-EF09-4F4C-B5E8-07CB6917BF4B}" type="datetimeFigureOut">
               <a:rPr lang="en-GB" smtClean="0"/>
-              <a:t>05/09/2021</a:t>
+              <a:t>07/09/2021</a:t>
             </a:fld>
             <a:endParaRPr lang="en-GB"/>
           </a:p>
@@ -466,7 +471,7 @@
           <a:p>
             <a:fld id="{22633246-EF09-4F4C-B5E8-07CB6917BF4B}" type="datetimeFigureOut">
               <a:rPr lang="en-GB" smtClean="0"/>
-              <a:t>05/09/2021</a:t>
+              <a:t>07/09/2021</a:t>
             </a:fld>
             <a:endParaRPr lang="en-GB"/>
           </a:p>
@@ -676,7 +681,7 @@
           <a:p>
             <a:fld id="{22633246-EF09-4F4C-B5E8-07CB6917BF4B}" type="datetimeFigureOut">
               <a:rPr lang="en-GB" smtClean="0"/>
-              <a:t>05/09/2021</a:t>
+              <a:t>07/09/2021</a:t>
             </a:fld>
             <a:endParaRPr lang="en-GB"/>
           </a:p>
@@ -876,7 +881,7 @@
           <a:p>
             <a:fld id="{22633246-EF09-4F4C-B5E8-07CB6917BF4B}" type="datetimeFigureOut">
               <a:rPr lang="en-GB" smtClean="0"/>
-              <a:t>05/09/2021</a:t>
+              <a:t>07/09/2021</a:t>
             </a:fld>
             <a:endParaRPr lang="en-GB"/>
           </a:p>
@@ -1152,7 +1157,7 @@
           <a:p>
             <a:fld id="{22633246-EF09-4F4C-B5E8-07CB6917BF4B}" type="datetimeFigureOut">
               <a:rPr lang="en-GB" smtClean="0"/>
-              <a:t>05/09/2021</a:t>
+              <a:t>07/09/2021</a:t>
             </a:fld>
             <a:endParaRPr lang="en-GB"/>
           </a:p>
@@ -1420,7 +1425,7 @@
           <a:p>
             <a:fld id="{22633246-EF09-4F4C-B5E8-07CB6917BF4B}" type="datetimeFigureOut">
               <a:rPr lang="en-GB" smtClean="0"/>
-              <a:t>05/09/2021</a:t>
+              <a:t>07/09/2021</a:t>
             </a:fld>
             <a:endParaRPr lang="en-GB"/>
           </a:p>
@@ -1835,7 +1840,7 @@
           <a:p>
             <a:fld id="{22633246-EF09-4F4C-B5E8-07CB6917BF4B}" type="datetimeFigureOut">
               <a:rPr lang="en-GB" smtClean="0"/>
-              <a:t>05/09/2021</a:t>
+              <a:t>07/09/2021</a:t>
             </a:fld>
             <a:endParaRPr lang="en-GB"/>
           </a:p>
@@ -1977,7 +1982,7 @@
           <a:p>
             <a:fld id="{22633246-EF09-4F4C-B5E8-07CB6917BF4B}" type="datetimeFigureOut">
               <a:rPr lang="en-GB" smtClean="0"/>
-              <a:t>05/09/2021</a:t>
+              <a:t>07/09/2021</a:t>
             </a:fld>
             <a:endParaRPr lang="en-GB"/>
           </a:p>
@@ -2090,7 +2095,7 @@
           <a:p>
             <a:fld id="{22633246-EF09-4F4C-B5E8-07CB6917BF4B}" type="datetimeFigureOut">
               <a:rPr lang="en-GB" smtClean="0"/>
-              <a:t>05/09/2021</a:t>
+              <a:t>07/09/2021</a:t>
             </a:fld>
             <a:endParaRPr lang="en-GB"/>
           </a:p>
@@ -2403,7 +2408,7 @@
           <a:p>
             <a:fld id="{22633246-EF09-4F4C-B5E8-07CB6917BF4B}" type="datetimeFigureOut">
               <a:rPr lang="en-GB" smtClean="0"/>
-              <a:t>05/09/2021</a:t>
+              <a:t>07/09/2021</a:t>
             </a:fld>
             <a:endParaRPr lang="en-GB"/>
           </a:p>
@@ -2692,7 +2697,7 @@
           <a:p>
             <a:fld id="{22633246-EF09-4F4C-B5E8-07CB6917BF4B}" type="datetimeFigureOut">
               <a:rPr lang="en-GB" smtClean="0"/>
-              <a:t>05/09/2021</a:t>
+              <a:t>07/09/2021</a:t>
             </a:fld>
             <a:endParaRPr lang="en-GB"/>
           </a:p>
@@ -2935,7 +2940,7 @@
           <a:p>
             <a:fld id="{22633246-EF09-4F4C-B5E8-07CB6917BF4B}" type="datetimeFigureOut">
               <a:rPr lang="en-GB" smtClean="0"/>
-              <a:t>05/09/2021</a:t>
+              <a:t>07/09/2021</a:t>
             </a:fld>
             <a:endParaRPr lang="en-GB"/>
           </a:p>
@@ -3496,10 +3501,382 @@
           </a:p>
         </p:txBody>
       </p:sp>
+      <p:pic>
+        <p:nvPicPr>
+          <p:cNvPr id="6" name="Picture 5">
+            <a:extLst>
+              <a:ext uri="{FF2B5EF4-FFF2-40B4-BE49-F238E27FC236}">
+                <a16:creationId xmlns:a16="http://schemas.microsoft.com/office/drawing/2014/main" id="{FB4D3987-EE3D-4CEA-803C-35A4E30D9311}"/>
+              </a:ext>
+            </a:extLst>
+          </p:cNvPr>
+          <p:cNvPicPr>
+            <a:picLocks noChangeAspect="1"/>
+          </p:cNvPicPr>
+          <p:nvPr/>
+        </p:nvPicPr>
+        <p:blipFill>
+          <a:blip r:embed="rId4"/>
+          <a:stretch>
+            <a:fillRect/>
+          </a:stretch>
+        </p:blipFill>
+        <p:spPr>
+          <a:xfrm>
+            <a:off x="9825606" y="1915050"/>
+            <a:ext cx="762000" cy="628650"/>
+          </a:xfrm>
+          <a:prstGeom prst="rect">
+            <a:avLst/>
+          </a:prstGeom>
+        </p:spPr>
+      </p:pic>
+      <p:pic>
+        <p:nvPicPr>
+          <p:cNvPr id="7" name="Picture 6">
+            <a:extLst>
+              <a:ext uri="{FF2B5EF4-FFF2-40B4-BE49-F238E27FC236}">
+                <a16:creationId xmlns:a16="http://schemas.microsoft.com/office/drawing/2014/main" id="{295D9FD5-41DB-4A96-A8A8-E000B30D5D61}"/>
+              </a:ext>
+            </a:extLst>
+          </p:cNvPr>
+          <p:cNvPicPr>
+            <a:picLocks noChangeAspect="1"/>
+          </p:cNvPicPr>
+          <p:nvPr/>
+        </p:nvPicPr>
+        <p:blipFill>
+          <a:blip r:embed="rId5"/>
+          <a:stretch>
+            <a:fillRect/>
+          </a:stretch>
+        </p:blipFill>
+        <p:spPr>
+          <a:xfrm>
+            <a:off x="9768456" y="2675100"/>
+            <a:ext cx="876300" cy="704850"/>
+          </a:xfrm>
+          <a:prstGeom prst="rect">
+            <a:avLst/>
+          </a:prstGeom>
+        </p:spPr>
+      </p:pic>
+      <p:pic>
+        <p:nvPicPr>
+          <p:cNvPr id="9" name="Picture 8">
+            <a:extLst>
+              <a:ext uri="{FF2B5EF4-FFF2-40B4-BE49-F238E27FC236}">
+                <a16:creationId xmlns:a16="http://schemas.microsoft.com/office/drawing/2014/main" id="{0B41E0BC-8D08-47B9-9E1C-EE5C4FD1444E}"/>
+              </a:ext>
+            </a:extLst>
+          </p:cNvPr>
+          <p:cNvPicPr>
+            <a:picLocks noChangeAspect="1"/>
+          </p:cNvPicPr>
+          <p:nvPr/>
+        </p:nvPicPr>
+        <p:blipFill>
+          <a:blip r:embed="rId6"/>
+          <a:stretch>
+            <a:fillRect/>
+          </a:stretch>
+        </p:blipFill>
+        <p:spPr>
+          <a:xfrm>
+            <a:off x="9782743" y="3511350"/>
+            <a:ext cx="847725" cy="581025"/>
+          </a:xfrm>
+          <a:prstGeom prst="rect">
+            <a:avLst/>
+          </a:prstGeom>
+        </p:spPr>
+      </p:pic>
+      <p:pic>
+        <p:nvPicPr>
+          <p:cNvPr id="11" name="Picture 10">
+            <a:extLst>
+              <a:ext uri="{FF2B5EF4-FFF2-40B4-BE49-F238E27FC236}">
+                <a16:creationId xmlns:a16="http://schemas.microsoft.com/office/drawing/2014/main" id="{3A51BFE1-B8D0-425D-A902-B4A97A643F14}"/>
+              </a:ext>
+            </a:extLst>
+          </p:cNvPr>
+          <p:cNvPicPr>
+            <a:picLocks noChangeAspect="1"/>
+          </p:cNvPicPr>
+          <p:nvPr/>
+        </p:nvPicPr>
+        <p:blipFill>
+          <a:blip r:embed="rId7"/>
+          <a:stretch>
+            <a:fillRect/>
+          </a:stretch>
+        </p:blipFill>
+        <p:spPr>
+          <a:xfrm>
+            <a:off x="9892281" y="4299459"/>
+            <a:ext cx="695325" cy="619125"/>
+          </a:xfrm>
+          <a:prstGeom prst="rect">
+            <a:avLst/>
+          </a:prstGeom>
+        </p:spPr>
+      </p:pic>
+      <p:sp>
+        <p:nvSpPr>
+          <p:cNvPr id="12" name="TextBox 11">
+            <a:extLst>
+              <a:ext uri="{FF2B5EF4-FFF2-40B4-BE49-F238E27FC236}">
+                <a16:creationId xmlns:a16="http://schemas.microsoft.com/office/drawing/2014/main" id="{FBA8E485-360E-4FB5-A1F7-1D7B40D06DFD}"/>
+              </a:ext>
+            </a:extLst>
+          </p:cNvPr>
+          <p:cNvSpPr txBox="1"/>
+          <p:nvPr/>
+        </p:nvSpPr>
+        <p:spPr>
+          <a:xfrm>
+            <a:off x="8173616" y="2039761"/>
+            <a:ext cx="1504061" cy="369332"/>
+          </a:xfrm>
+          <a:prstGeom prst="rect">
+            <a:avLst/>
+          </a:prstGeom>
+          <a:noFill/>
+        </p:spPr>
+        <p:txBody>
+          <a:bodyPr wrap="square" rtlCol="0">
+            <a:spAutoFit/>
+          </a:bodyPr>
+          <a:lstStyle/>
+          <a:p>
+            <a:r>
+              <a:rPr lang="en-US" b="1" dirty="0"/>
+              <a:t>round, yellow</a:t>
+            </a:r>
+            <a:endParaRPr lang="en-GB" b="1" dirty="0"/>
+          </a:p>
+        </p:txBody>
+      </p:sp>
+      <p:sp>
+        <p:nvSpPr>
+          <p:cNvPr id="13" name="TextBox 12">
+            <a:extLst>
+              <a:ext uri="{FF2B5EF4-FFF2-40B4-BE49-F238E27FC236}">
+                <a16:creationId xmlns:a16="http://schemas.microsoft.com/office/drawing/2014/main" id="{A0BACC1E-C435-4673-8778-6C16301B6094}"/>
+              </a:ext>
+            </a:extLst>
+          </p:cNvPr>
+          <p:cNvSpPr txBox="1"/>
+          <p:nvPr/>
+        </p:nvSpPr>
+        <p:spPr>
+          <a:xfrm>
+            <a:off x="8173616" y="2865060"/>
+            <a:ext cx="1504061" cy="369332"/>
+          </a:xfrm>
+          <a:prstGeom prst="rect">
+            <a:avLst/>
+          </a:prstGeom>
+          <a:noFill/>
+        </p:spPr>
+        <p:txBody>
+          <a:bodyPr wrap="square" rtlCol="0">
+            <a:spAutoFit/>
+          </a:bodyPr>
+          <a:lstStyle/>
+          <a:p>
+            <a:r>
+              <a:rPr lang="en-US" b="1" dirty="0"/>
+              <a:t>round, green</a:t>
+            </a:r>
+            <a:endParaRPr lang="en-GB" b="1" dirty="0"/>
+          </a:p>
+        </p:txBody>
+      </p:sp>
+      <p:sp>
+        <p:nvSpPr>
+          <p:cNvPr id="14" name="TextBox 13">
+            <a:extLst>
+              <a:ext uri="{FF2B5EF4-FFF2-40B4-BE49-F238E27FC236}">
+                <a16:creationId xmlns:a16="http://schemas.microsoft.com/office/drawing/2014/main" id="{F463F52B-A7C8-4538-A4C4-13111C9D9CC1}"/>
+              </a:ext>
+            </a:extLst>
+          </p:cNvPr>
+          <p:cNvSpPr txBox="1"/>
+          <p:nvPr/>
+        </p:nvSpPr>
+        <p:spPr>
+          <a:xfrm>
+            <a:off x="8173616" y="3668011"/>
+            <a:ext cx="1819470" cy="369332"/>
+          </a:xfrm>
+          <a:prstGeom prst="rect">
+            <a:avLst/>
+          </a:prstGeom>
+          <a:noFill/>
+        </p:spPr>
+        <p:txBody>
+          <a:bodyPr wrap="square" rtlCol="0">
+            <a:spAutoFit/>
+          </a:bodyPr>
+          <a:lstStyle/>
+          <a:p>
+            <a:r>
+              <a:rPr lang="en-US" b="1" dirty="0"/>
+              <a:t>wrinkled, yellow</a:t>
+            </a:r>
+            <a:endParaRPr lang="en-GB" b="1" dirty="0"/>
+          </a:p>
+        </p:txBody>
+      </p:sp>
+      <p:sp>
+        <p:nvSpPr>
+          <p:cNvPr id="15" name="TextBox 14">
+            <a:extLst>
+              <a:ext uri="{FF2B5EF4-FFF2-40B4-BE49-F238E27FC236}">
+                <a16:creationId xmlns:a16="http://schemas.microsoft.com/office/drawing/2014/main" id="{EF2BEFE5-14C6-4D80-B9B9-D67DD4A79E9C}"/>
+              </a:ext>
+            </a:extLst>
+          </p:cNvPr>
+          <p:cNvSpPr txBox="1"/>
+          <p:nvPr/>
+        </p:nvSpPr>
+        <p:spPr>
+          <a:xfrm>
+            <a:off x="8173616" y="4505761"/>
+            <a:ext cx="1819470" cy="369332"/>
+          </a:xfrm>
+          <a:prstGeom prst="rect">
+            <a:avLst/>
+          </a:prstGeom>
+          <a:noFill/>
+        </p:spPr>
+        <p:txBody>
+          <a:bodyPr wrap="square" rtlCol="0">
+            <a:spAutoFit/>
+          </a:bodyPr>
+          <a:lstStyle/>
+          <a:p>
+            <a:r>
+              <a:rPr lang="en-US" b="1" dirty="0"/>
+              <a:t>wrinkled, green</a:t>
+            </a:r>
+            <a:endParaRPr lang="en-GB" b="1" dirty="0"/>
+          </a:p>
+        </p:txBody>
+      </p:sp>
+      <p:sp>
+        <p:nvSpPr>
+          <p:cNvPr id="2" name="Rectangle 1">
+            <a:extLst>
+              <a:ext uri="{FF2B5EF4-FFF2-40B4-BE49-F238E27FC236}">
+                <a16:creationId xmlns:a16="http://schemas.microsoft.com/office/drawing/2014/main" id="{A56F6C30-EC7F-4D0A-8CD3-5F46D9535988}"/>
+              </a:ext>
+            </a:extLst>
+          </p:cNvPr>
+          <p:cNvSpPr/>
+          <p:nvPr/>
+        </p:nvSpPr>
+        <p:spPr>
+          <a:xfrm>
+            <a:off x="1812022" y="759934"/>
+            <a:ext cx="2332139" cy="389477"/>
+          </a:xfrm>
+          <a:prstGeom prst="rect">
+            <a:avLst/>
+          </a:prstGeom>
+          <a:solidFill>
+            <a:schemeClr val="bg1"/>
+          </a:solidFill>
+          <a:ln>
+            <a:solidFill>
+              <a:schemeClr val="bg1"/>
+            </a:solidFill>
+          </a:ln>
+        </p:spPr>
+        <p:style>
+          <a:lnRef idx="2">
+            <a:schemeClr val="accent1">
+              <a:shade val="50000"/>
+            </a:schemeClr>
+          </a:lnRef>
+          <a:fillRef idx="1">
+            <a:schemeClr val="accent1"/>
+          </a:fillRef>
+          <a:effectRef idx="0">
+            <a:schemeClr val="accent1"/>
+          </a:effectRef>
+          <a:fontRef idx="minor">
+            <a:schemeClr val="lt1"/>
+          </a:fontRef>
+        </p:style>
+        <p:txBody>
+          <a:bodyPr rtlCol="0" anchor="ctr"/>
+          <a:lstStyle/>
+          <a:p>
+            <a:pPr algn="ctr"/>
+            <a:endParaRPr lang="en-GB"/>
+          </a:p>
+        </p:txBody>
+      </p:sp>
+      <p:sp>
+        <p:nvSpPr>
+          <p:cNvPr id="16" name="Rectangle 15">
+            <a:extLst>
+              <a:ext uri="{FF2B5EF4-FFF2-40B4-BE49-F238E27FC236}">
+                <a16:creationId xmlns:a16="http://schemas.microsoft.com/office/drawing/2014/main" id="{E48B5589-B66B-44E8-8007-8B75FD3F2001}"/>
+              </a:ext>
+            </a:extLst>
+          </p:cNvPr>
+          <p:cNvSpPr/>
+          <p:nvPr/>
+        </p:nvSpPr>
+        <p:spPr>
+          <a:xfrm>
+            <a:off x="421674" y="2975824"/>
+            <a:ext cx="1102488" cy="906351"/>
+          </a:xfrm>
+          <a:prstGeom prst="rect">
+            <a:avLst/>
+          </a:prstGeom>
+          <a:solidFill>
+            <a:schemeClr val="bg1"/>
+          </a:solidFill>
+          <a:ln>
+            <a:solidFill>
+              <a:schemeClr val="bg1"/>
+            </a:solidFill>
+          </a:ln>
+        </p:spPr>
+        <p:style>
+          <a:lnRef idx="2">
+            <a:schemeClr val="accent1">
+              <a:shade val="50000"/>
+            </a:schemeClr>
+          </a:lnRef>
+          <a:fillRef idx="1">
+            <a:schemeClr val="accent1"/>
+          </a:fillRef>
+          <a:effectRef idx="0">
+            <a:schemeClr val="accent1"/>
+          </a:effectRef>
+          <a:fontRef idx="minor">
+            <a:schemeClr val="lt1"/>
+          </a:fontRef>
+        </p:style>
+        <p:txBody>
+          <a:bodyPr rtlCol="0" anchor="ctr"/>
+          <a:lstStyle/>
+          <a:p>
+            <a:pPr algn="ctr"/>
+            <a:endParaRPr lang="en-GB"/>
+          </a:p>
+        </p:txBody>
+      </p:sp>
     </p:spTree>
     <p:extLst>
       <p:ext uri="{BB962C8B-B14F-4D97-AF65-F5344CB8AC3E}">
-        <p14:creationId xmlns:p14="http://schemas.microsoft.com/office/powerpoint/2010/main" val="2549197502"/>
+        <p14:creationId xmlns:p14="http://schemas.microsoft.com/office/powerpoint/2010/main" val="2855903547"/>
       </p:ext>
     </p:extLst>
   </p:cSld>
@@ -4908,6 +5285,378 @@
           </a:p>
         </p:txBody>
       </p:sp>
+      <p:pic>
+        <p:nvPicPr>
+          <p:cNvPr id="9" name="Picture 8">
+            <a:extLst>
+              <a:ext uri="{FF2B5EF4-FFF2-40B4-BE49-F238E27FC236}">
+                <a16:creationId xmlns:a16="http://schemas.microsoft.com/office/drawing/2014/main" id="{72AB389E-4BE1-4EB9-8053-4B236D2B1F39}"/>
+              </a:ext>
+            </a:extLst>
+          </p:cNvPr>
+          <p:cNvPicPr>
+            <a:picLocks noChangeAspect="1"/>
+          </p:cNvPicPr>
+          <p:nvPr/>
+        </p:nvPicPr>
+        <p:blipFill>
+          <a:blip r:embed="rId4"/>
+          <a:stretch>
+            <a:fillRect/>
+          </a:stretch>
+        </p:blipFill>
+        <p:spPr>
+          <a:xfrm>
+            <a:off x="9825606" y="1915050"/>
+            <a:ext cx="762000" cy="628650"/>
+          </a:xfrm>
+          <a:prstGeom prst="rect">
+            <a:avLst/>
+          </a:prstGeom>
+        </p:spPr>
+      </p:pic>
+      <p:pic>
+        <p:nvPicPr>
+          <p:cNvPr id="11" name="Picture 10">
+            <a:extLst>
+              <a:ext uri="{FF2B5EF4-FFF2-40B4-BE49-F238E27FC236}">
+                <a16:creationId xmlns:a16="http://schemas.microsoft.com/office/drawing/2014/main" id="{34BDE347-0186-4B27-A8BA-4F4FDF7ECB7F}"/>
+              </a:ext>
+            </a:extLst>
+          </p:cNvPr>
+          <p:cNvPicPr>
+            <a:picLocks noChangeAspect="1"/>
+          </p:cNvPicPr>
+          <p:nvPr/>
+        </p:nvPicPr>
+        <p:blipFill>
+          <a:blip r:embed="rId5"/>
+          <a:stretch>
+            <a:fillRect/>
+          </a:stretch>
+        </p:blipFill>
+        <p:spPr>
+          <a:xfrm>
+            <a:off x="9768456" y="2675100"/>
+            <a:ext cx="876300" cy="704850"/>
+          </a:xfrm>
+          <a:prstGeom prst="rect">
+            <a:avLst/>
+          </a:prstGeom>
+        </p:spPr>
+      </p:pic>
+      <p:pic>
+        <p:nvPicPr>
+          <p:cNvPr id="12" name="Picture 11">
+            <a:extLst>
+              <a:ext uri="{FF2B5EF4-FFF2-40B4-BE49-F238E27FC236}">
+                <a16:creationId xmlns:a16="http://schemas.microsoft.com/office/drawing/2014/main" id="{F766FD09-40EF-4E2A-9EC4-08A7842D6085}"/>
+              </a:ext>
+            </a:extLst>
+          </p:cNvPr>
+          <p:cNvPicPr>
+            <a:picLocks noChangeAspect="1"/>
+          </p:cNvPicPr>
+          <p:nvPr/>
+        </p:nvPicPr>
+        <p:blipFill>
+          <a:blip r:embed="rId6"/>
+          <a:stretch>
+            <a:fillRect/>
+          </a:stretch>
+        </p:blipFill>
+        <p:spPr>
+          <a:xfrm>
+            <a:off x="9782743" y="3511350"/>
+            <a:ext cx="847725" cy="581025"/>
+          </a:xfrm>
+          <a:prstGeom prst="rect">
+            <a:avLst/>
+          </a:prstGeom>
+        </p:spPr>
+      </p:pic>
+      <p:pic>
+        <p:nvPicPr>
+          <p:cNvPr id="13" name="Picture 12">
+            <a:extLst>
+              <a:ext uri="{FF2B5EF4-FFF2-40B4-BE49-F238E27FC236}">
+                <a16:creationId xmlns:a16="http://schemas.microsoft.com/office/drawing/2014/main" id="{4838E58A-8509-422F-9C13-C4536B2DEFE1}"/>
+              </a:ext>
+            </a:extLst>
+          </p:cNvPr>
+          <p:cNvPicPr>
+            <a:picLocks noChangeAspect="1"/>
+          </p:cNvPicPr>
+          <p:nvPr/>
+        </p:nvPicPr>
+        <p:blipFill>
+          <a:blip r:embed="rId7"/>
+          <a:stretch>
+            <a:fillRect/>
+          </a:stretch>
+        </p:blipFill>
+        <p:spPr>
+          <a:xfrm>
+            <a:off x="9892281" y="4299459"/>
+            <a:ext cx="695325" cy="619125"/>
+          </a:xfrm>
+          <a:prstGeom prst="rect">
+            <a:avLst/>
+          </a:prstGeom>
+        </p:spPr>
+      </p:pic>
+      <p:sp>
+        <p:nvSpPr>
+          <p:cNvPr id="14" name="TextBox 13">
+            <a:extLst>
+              <a:ext uri="{FF2B5EF4-FFF2-40B4-BE49-F238E27FC236}">
+                <a16:creationId xmlns:a16="http://schemas.microsoft.com/office/drawing/2014/main" id="{69D387EC-1A64-4B21-AE68-4024FC457154}"/>
+              </a:ext>
+            </a:extLst>
+          </p:cNvPr>
+          <p:cNvSpPr txBox="1"/>
+          <p:nvPr/>
+        </p:nvSpPr>
+        <p:spPr>
+          <a:xfrm>
+            <a:off x="8173616" y="2039761"/>
+            <a:ext cx="1504061" cy="369332"/>
+          </a:xfrm>
+          <a:prstGeom prst="rect">
+            <a:avLst/>
+          </a:prstGeom>
+          <a:noFill/>
+        </p:spPr>
+        <p:txBody>
+          <a:bodyPr wrap="square" rtlCol="0">
+            <a:spAutoFit/>
+          </a:bodyPr>
+          <a:lstStyle/>
+          <a:p>
+            <a:r>
+              <a:rPr lang="en-US" b="1" dirty="0"/>
+              <a:t>round, yellow</a:t>
+            </a:r>
+            <a:endParaRPr lang="en-GB" b="1" dirty="0"/>
+          </a:p>
+        </p:txBody>
+      </p:sp>
+      <p:sp>
+        <p:nvSpPr>
+          <p:cNvPr id="15" name="TextBox 14">
+            <a:extLst>
+              <a:ext uri="{FF2B5EF4-FFF2-40B4-BE49-F238E27FC236}">
+                <a16:creationId xmlns:a16="http://schemas.microsoft.com/office/drawing/2014/main" id="{5B9BA739-C492-4542-8BB8-BD6F87499862}"/>
+              </a:ext>
+            </a:extLst>
+          </p:cNvPr>
+          <p:cNvSpPr txBox="1"/>
+          <p:nvPr/>
+        </p:nvSpPr>
+        <p:spPr>
+          <a:xfrm>
+            <a:off x="8173616" y="2865060"/>
+            <a:ext cx="1504061" cy="369332"/>
+          </a:xfrm>
+          <a:prstGeom prst="rect">
+            <a:avLst/>
+          </a:prstGeom>
+          <a:noFill/>
+        </p:spPr>
+        <p:txBody>
+          <a:bodyPr wrap="square" rtlCol="0">
+            <a:spAutoFit/>
+          </a:bodyPr>
+          <a:lstStyle/>
+          <a:p>
+            <a:r>
+              <a:rPr lang="en-US" b="1" dirty="0"/>
+              <a:t>round, green</a:t>
+            </a:r>
+            <a:endParaRPr lang="en-GB" b="1" dirty="0"/>
+          </a:p>
+        </p:txBody>
+      </p:sp>
+      <p:sp>
+        <p:nvSpPr>
+          <p:cNvPr id="16" name="TextBox 15">
+            <a:extLst>
+              <a:ext uri="{FF2B5EF4-FFF2-40B4-BE49-F238E27FC236}">
+                <a16:creationId xmlns:a16="http://schemas.microsoft.com/office/drawing/2014/main" id="{38BA9164-3E77-4935-9258-86A4E2310F78}"/>
+              </a:ext>
+            </a:extLst>
+          </p:cNvPr>
+          <p:cNvSpPr txBox="1"/>
+          <p:nvPr/>
+        </p:nvSpPr>
+        <p:spPr>
+          <a:xfrm>
+            <a:off x="8173616" y="3668011"/>
+            <a:ext cx="1819470" cy="369332"/>
+          </a:xfrm>
+          <a:prstGeom prst="rect">
+            <a:avLst/>
+          </a:prstGeom>
+          <a:noFill/>
+        </p:spPr>
+        <p:txBody>
+          <a:bodyPr wrap="square" rtlCol="0">
+            <a:spAutoFit/>
+          </a:bodyPr>
+          <a:lstStyle/>
+          <a:p>
+            <a:r>
+              <a:rPr lang="en-US" b="1" dirty="0"/>
+              <a:t>wrinkled, yellow</a:t>
+            </a:r>
+            <a:endParaRPr lang="en-GB" b="1" dirty="0"/>
+          </a:p>
+        </p:txBody>
+      </p:sp>
+      <p:sp>
+        <p:nvSpPr>
+          <p:cNvPr id="18" name="TextBox 17">
+            <a:extLst>
+              <a:ext uri="{FF2B5EF4-FFF2-40B4-BE49-F238E27FC236}">
+                <a16:creationId xmlns:a16="http://schemas.microsoft.com/office/drawing/2014/main" id="{252BED99-BA2D-4C10-BAE5-B35C4FD74703}"/>
+              </a:ext>
+            </a:extLst>
+          </p:cNvPr>
+          <p:cNvSpPr txBox="1"/>
+          <p:nvPr/>
+        </p:nvSpPr>
+        <p:spPr>
+          <a:xfrm>
+            <a:off x="8173616" y="4505761"/>
+            <a:ext cx="1819470" cy="369332"/>
+          </a:xfrm>
+          <a:prstGeom prst="rect">
+            <a:avLst/>
+          </a:prstGeom>
+          <a:noFill/>
+        </p:spPr>
+        <p:txBody>
+          <a:bodyPr wrap="square" rtlCol="0">
+            <a:spAutoFit/>
+          </a:bodyPr>
+          <a:lstStyle/>
+          <a:p>
+            <a:r>
+              <a:rPr lang="en-US" b="1" dirty="0"/>
+              <a:t>wrinkled, green</a:t>
+            </a:r>
+            <a:endParaRPr lang="en-GB" b="1" dirty="0"/>
+          </a:p>
+        </p:txBody>
+      </p:sp>
+      <p:sp>
+        <p:nvSpPr>
+          <p:cNvPr id="20" name="Rectangle 19">
+            <a:extLst>
+              <a:ext uri="{FF2B5EF4-FFF2-40B4-BE49-F238E27FC236}">
+                <a16:creationId xmlns:a16="http://schemas.microsoft.com/office/drawing/2014/main" id="{33475687-5C76-4351-B953-EAA781275A2B}"/>
+              </a:ext>
+            </a:extLst>
+          </p:cNvPr>
+          <p:cNvSpPr/>
+          <p:nvPr/>
+        </p:nvSpPr>
+        <p:spPr>
+          <a:xfrm>
+            <a:off x="1812022" y="759934"/>
+            <a:ext cx="2332139" cy="389477"/>
+          </a:xfrm>
+          <a:prstGeom prst="rect">
+            <a:avLst/>
+          </a:prstGeom>
+          <a:solidFill>
+            <a:schemeClr val="bg1"/>
+          </a:solidFill>
+          <a:ln>
+            <a:solidFill>
+              <a:schemeClr val="bg1"/>
+            </a:solidFill>
+          </a:ln>
+        </p:spPr>
+        <p:style>
+          <a:lnRef idx="2">
+            <a:schemeClr val="accent1">
+              <a:shade val="50000"/>
+            </a:schemeClr>
+          </a:lnRef>
+          <a:fillRef idx="1">
+            <a:schemeClr val="accent1"/>
+          </a:fillRef>
+          <a:effectRef idx="0">
+            <a:schemeClr val="accent1"/>
+          </a:effectRef>
+          <a:fontRef idx="minor">
+            <a:schemeClr val="lt1"/>
+          </a:fontRef>
+        </p:style>
+        <p:txBody>
+          <a:bodyPr rtlCol="0" anchor="ctr"/>
+          <a:lstStyle/>
+          <a:p>
+            <a:pPr algn="ctr"/>
+            <a:endParaRPr lang="en-GB"/>
+          </a:p>
+        </p:txBody>
+      </p:sp>
+      <p:sp>
+        <p:nvSpPr>
+          <p:cNvPr id="21" name="Rectangle 20">
+            <a:extLst>
+              <a:ext uri="{FF2B5EF4-FFF2-40B4-BE49-F238E27FC236}">
+                <a16:creationId xmlns:a16="http://schemas.microsoft.com/office/drawing/2014/main" id="{CD7BCB9B-1F57-45E7-A1C6-D6C8B2F8B2C6}"/>
+              </a:ext>
+            </a:extLst>
+          </p:cNvPr>
+          <p:cNvSpPr/>
+          <p:nvPr/>
+        </p:nvSpPr>
+        <p:spPr>
+          <a:xfrm>
+            <a:off x="421674" y="2975824"/>
+            <a:ext cx="1102488" cy="906351"/>
+          </a:xfrm>
+          <a:prstGeom prst="rect">
+            <a:avLst/>
+          </a:prstGeom>
+          <a:solidFill>
+            <a:schemeClr val="bg1"/>
+          </a:solidFill>
+          <a:ln>
+            <a:solidFill>
+              <a:schemeClr val="bg1"/>
+            </a:solidFill>
+          </a:ln>
+        </p:spPr>
+        <p:style>
+          <a:lnRef idx="2">
+            <a:schemeClr val="accent1">
+              <a:shade val="50000"/>
+            </a:schemeClr>
+          </a:lnRef>
+          <a:fillRef idx="1">
+            <a:schemeClr val="accent1"/>
+          </a:fillRef>
+          <a:effectRef idx="0">
+            <a:schemeClr val="accent1"/>
+          </a:effectRef>
+          <a:fontRef idx="minor">
+            <a:schemeClr val="lt1"/>
+          </a:fontRef>
+        </p:style>
+        <p:txBody>
+          <a:bodyPr rtlCol="0" anchor="ctr"/>
+          <a:lstStyle/>
+          <a:p>
+            <a:pPr algn="ctr"/>
+            <a:endParaRPr lang="en-GB"/>
+          </a:p>
+        </p:txBody>
+      </p:sp>
     </p:spTree>
     <p:extLst>
       <p:ext uri="{BB962C8B-B14F-4D97-AF65-F5344CB8AC3E}">
@@ -5298,6 +6047,378 @@
           </a:p>
         </p:txBody>
       </p:sp>
+      <p:pic>
+        <p:nvPicPr>
+          <p:cNvPr id="11" name="Picture 10">
+            <a:extLst>
+              <a:ext uri="{FF2B5EF4-FFF2-40B4-BE49-F238E27FC236}">
+                <a16:creationId xmlns:a16="http://schemas.microsoft.com/office/drawing/2014/main" id="{185125B6-258F-4425-ADEC-EF7BD441B3D1}"/>
+              </a:ext>
+            </a:extLst>
+          </p:cNvPr>
+          <p:cNvPicPr>
+            <a:picLocks noChangeAspect="1"/>
+          </p:cNvPicPr>
+          <p:nvPr/>
+        </p:nvPicPr>
+        <p:blipFill>
+          <a:blip r:embed="rId4"/>
+          <a:stretch>
+            <a:fillRect/>
+          </a:stretch>
+        </p:blipFill>
+        <p:spPr>
+          <a:xfrm>
+            <a:off x="9825606" y="1915050"/>
+            <a:ext cx="762000" cy="628650"/>
+          </a:xfrm>
+          <a:prstGeom prst="rect">
+            <a:avLst/>
+          </a:prstGeom>
+        </p:spPr>
+      </p:pic>
+      <p:pic>
+        <p:nvPicPr>
+          <p:cNvPr id="12" name="Picture 11">
+            <a:extLst>
+              <a:ext uri="{FF2B5EF4-FFF2-40B4-BE49-F238E27FC236}">
+                <a16:creationId xmlns:a16="http://schemas.microsoft.com/office/drawing/2014/main" id="{C12BF24D-A4F7-4804-8C0B-4E5481F3067E}"/>
+              </a:ext>
+            </a:extLst>
+          </p:cNvPr>
+          <p:cNvPicPr>
+            <a:picLocks noChangeAspect="1"/>
+          </p:cNvPicPr>
+          <p:nvPr/>
+        </p:nvPicPr>
+        <p:blipFill>
+          <a:blip r:embed="rId5"/>
+          <a:stretch>
+            <a:fillRect/>
+          </a:stretch>
+        </p:blipFill>
+        <p:spPr>
+          <a:xfrm>
+            <a:off x="9768456" y="2675100"/>
+            <a:ext cx="876300" cy="704850"/>
+          </a:xfrm>
+          <a:prstGeom prst="rect">
+            <a:avLst/>
+          </a:prstGeom>
+        </p:spPr>
+      </p:pic>
+      <p:pic>
+        <p:nvPicPr>
+          <p:cNvPr id="13" name="Picture 12">
+            <a:extLst>
+              <a:ext uri="{FF2B5EF4-FFF2-40B4-BE49-F238E27FC236}">
+                <a16:creationId xmlns:a16="http://schemas.microsoft.com/office/drawing/2014/main" id="{4BC6A20F-7058-48A5-9033-E6A33DF74EB8}"/>
+              </a:ext>
+            </a:extLst>
+          </p:cNvPr>
+          <p:cNvPicPr>
+            <a:picLocks noChangeAspect="1"/>
+          </p:cNvPicPr>
+          <p:nvPr/>
+        </p:nvPicPr>
+        <p:blipFill>
+          <a:blip r:embed="rId6"/>
+          <a:stretch>
+            <a:fillRect/>
+          </a:stretch>
+        </p:blipFill>
+        <p:spPr>
+          <a:xfrm>
+            <a:off x="9782743" y="3511350"/>
+            <a:ext cx="847725" cy="581025"/>
+          </a:xfrm>
+          <a:prstGeom prst="rect">
+            <a:avLst/>
+          </a:prstGeom>
+        </p:spPr>
+      </p:pic>
+      <p:pic>
+        <p:nvPicPr>
+          <p:cNvPr id="15" name="Picture 14">
+            <a:extLst>
+              <a:ext uri="{FF2B5EF4-FFF2-40B4-BE49-F238E27FC236}">
+                <a16:creationId xmlns:a16="http://schemas.microsoft.com/office/drawing/2014/main" id="{D6F2F225-8883-464C-ACD3-125751239383}"/>
+              </a:ext>
+            </a:extLst>
+          </p:cNvPr>
+          <p:cNvPicPr>
+            <a:picLocks noChangeAspect="1"/>
+          </p:cNvPicPr>
+          <p:nvPr/>
+        </p:nvPicPr>
+        <p:blipFill>
+          <a:blip r:embed="rId7"/>
+          <a:stretch>
+            <a:fillRect/>
+          </a:stretch>
+        </p:blipFill>
+        <p:spPr>
+          <a:xfrm>
+            <a:off x="9892281" y="4299459"/>
+            <a:ext cx="695325" cy="619125"/>
+          </a:xfrm>
+          <a:prstGeom prst="rect">
+            <a:avLst/>
+          </a:prstGeom>
+        </p:spPr>
+      </p:pic>
+      <p:sp>
+        <p:nvSpPr>
+          <p:cNvPr id="16" name="TextBox 15">
+            <a:extLst>
+              <a:ext uri="{FF2B5EF4-FFF2-40B4-BE49-F238E27FC236}">
+                <a16:creationId xmlns:a16="http://schemas.microsoft.com/office/drawing/2014/main" id="{246C3ECF-B123-45B3-AD35-FDE01FDD9715}"/>
+              </a:ext>
+            </a:extLst>
+          </p:cNvPr>
+          <p:cNvSpPr txBox="1"/>
+          <p:nvPr/>
+        </p:nvSpPr>
+        <p:spPr>
+          <a:xfrm>
+            <a:off x="8173616" y="2039761"/>
+            <a:ext cx="1504061" cy="369332"/>
+          </a:xfrm>
+          <a:prstGeom prst="rect">
+            <a:avLst/>
+          </a:prstGeom>
+          <a:noFill/>
+        </p:spPr>
+        <p:txBody>
+          <a:bodyPr wrap="square" rtlCol="0">
+            <a:spAutoFit/>
+          </a:bodyPr>
+          <a:lstStyle/>
+          <a:p>
+            <a:r>
+              <a:rPr lang="en-US" b="1" dirty="0"/>
+              <a:t>round, yellow</a:t>
+            </a:r>
+            <a:endParaRPr lang="en-GB" b="1" dirty="0"/>
+          </a:p>
+        </p:txBody>
+      </p:sp>
+      <p:sp>
+        <p:nvSpPr>
+          <p:cNvPr id="18" name="TextBox 17">
+            <a:extLst>
+              <a:ext uri="{FF2B5EF4-FFF2-40B4-BE49-F238E27FC236}">
+                <a16:creationId xmlns:a16="http://schemas.microsoft.com/office/drawing/2014/main" id="{D0604493-EBF6-4430-82DC-D3F88F02DFBD}"/>
+              </a:ext>
+            </a:extLst>
+          </p:cNvPr>
+          <p:cNvSpPr txBox="1"/>
+          <p:nvPr/>
+        </p:nvSpPr>
+        <p:spPr>
+          <a:xfrm>
+            <a:off x="8173616" y="2865060"/>
+            <a:ext cx="1504061" cy="369332"/>
+          </a:xfrm>
+          <a:prstGeom prst="rect">
+            <a:avLst/>
+          </a:prstGeom>
+          <a:noFill/>
+        </p:spPr>
+        <p:txBody>
+          <a:bodyPr wrap="square" rtlCol="0">
+            <a:spAutoFit/>
+          </a:bodyPr>
+          <a:lstStyle/>
+          <a:p>
+            <a:r>
+              <a:rPr lang="en-US" b="1" dirty="0"/>
+              <a:t>round, green</a:t>
+            </a:r>
+            <a:endParaRPr lang="en-GB" b="1" dirty="0"/>
+          </a:p>
+        </p:txBody>
+      </p:sp>
+      <p:sp>
+        <p:nvSpPr>
+          <p:cNvPr id="20" name="TextBox 19">
+            <a:extLst>
+              <a:ext uri="{FF2B5EF4-FFF2-40B4-BE49-F238E27FC236}">
+                <a16:creationId xmlns:a16="http://schemas.microsoft.com/office/drawing/2014/main" id="{AEC37FFB-A37E-4A7B-ABD9-87223DFE4044}"/>
+              </a:ext>
+            </a:extLst>
+          </p:cNvPr>
+          <p:cNvSpPr txBox="1"/>
+          <p:nvPr/>
+        </p:nvSpPr>
+        <p:spPr>
+          <a:xfrm>
+            <a:off x="8173616" y="3668011"/>
+            <a:ext cx="1819470" cy="369332"/>
+          </a:xfrm>
+          <a:prstGeom prst="rect">
+            <a:avLst/>
+          </a:prstGeom>
+          <a:noFill/>
+        </p:spPr>
+        <p:txBody>
+          <a:bodyPr wrap="square" rtlCol="0">
+            <a:spAutoFit/>
+          </a:bodyPr>
+          <a:lstStyle/>
+          <a:p>
+            <a:r>
+              <a:rPr lang="en-US" b="1" dirty="0"/>
+              <a:t>wrinkled, yellow</a:t>
+            </a:r>
+            <a:endParaRPr lang="en-GB" b="1" dirty="0"/>
+          </a:p>
+        </p:txBody>
+      </p:sp>
+      <p:sp>
+        <p:nvSpPr>
+          <p:cNvPr id="21" name="TextBox 20">
+            <a:extLst>
+              <a:ext uri="{FF2B5EF4-FFF2-40B4-BE49-F238E27FC236}">
+                <a16:creationId xmlns:a16="http://schemas.microsoft.com/office/drawing/2014/main" id="{A3C15A23-8D9F-49B8-8022-215427E98466}"/>
+              </a:ext>
+            </a:extLst>
+          </p:cNvPr>
+          <p:cNvSpPr txBox="1"/>
+          <p:nvPr/>
+        </p:nvSpPr>
+        <p:spPr>
+          <a:xfrm>
+            <a:off x="8173616" y="4505761"/>
+            <a:ext cx="1819470" cy="369332"/>
+          </a:xfrm>
+          <a:prstGeom prst="rect">
+            <a:avLst/>
+          </a:prstGeom>
+          <a:noFill/>
+        </p:spPr>
+        <p:txBody>
+          <a:bodyPr wrap="square" rtlCol="0">
+            <a:spAutoFit/>
+          </a:bodyPr>
+          <a:lstStyle/>
+          <a:p>
+            <a:r>
+              <a:rPr lang="en-US" b="1" dirty="0"/>
+              <a:t>wrinkled, green</a:t>
+            </a:r>
+            <a:endParaRPr lang="en-GB" b="1" dirty="0"/>
+          </a:p>
+        </p:txBody>
+      </p:sp>
+      <p:sp>
+        <p:nvSpPr>
+          <p:cNvPr id="22" name="Rectangle 21">
+            <a:extLst>
+              <a:ext uri="{FF2B5EF4-FFF2-40B4-BE49-F238E27FC236}">
+                <a16:creationId xmlns:a16="http://schemas.microsoft.com/office/drawing/2014/main" id="{4D49889D-1D64-486B-AAD3-8F6F459FC480}"/>
+              </a:ext>
+            </a:extLst>
+          </p:cNvPr>
+          <p:cNvSpPr/>
+          <p:nvPr/>
+        </p:nvSpPr>
+        <p:spPr>
+          <a:xfrm>
+            <a:off x="1812022" y="759934"/>
+            <a:ext cx="2332139" cy="389477"/>
+          </a:xfrm>
+          <a:prstGeom prst="rect">
+            <a:avLst/>
+          </a:prstGeom>
+          <a:solidFill>
+            <a:schemeClr val="bg1"/>
+          </a:solidFill>
+          <a:ln>
+            <a:solidFill>
+              <a:schemeClr val="bg1"/>
+            </a:solidFill>
+          </a:ln>
+        </p:spPr>
+        <p:style>
+          <a:lnRef idx="2">
+            <a:schemeClr val="accent1">
+              <a:shade val="50000"/>
+            </a:schemeClr>
+          </a:lnRef>
+          <a:fillRef idx="1">
+            <a:schemeClr val="accent1"/>
+          </a:fillRef>
+          <a:effectRef idx="0">
+            <a:schemeClr val="accent1"/>
+          </a:effectRef>
+          <a:fontRef idx="minor">
+            <a:schemeClr val="lt1"/>
+          </a:fontRef>
+        </p:style>
+        <p:txBody>
+          <a:bodyPr rtlCol="0" anchor="ctr"/>
+          <a:lstStyle/>
+          <a:p>
+            <a:pPr algn="ctr"/>
+            <a:endParaRPr lang="en-GB"/>
+          </a:p>
+        </p:txBody>
+      </p:sp>
+      <p:sp>
+        <p:nvSpPr>
+          <p:cNvPr id="23" name="Rectangle 22">
+            <a:extLst>
+              <a:ext uri="{FF2B5EF4-FFF2-40B4-BE49-F238E27FC236}">
+                <a16:creationId xmlns:a16="http://schemas.microsoft.com/office/drawing/2014/main" id="{67C5C7D7-14F3-4224-89D0-F96A0BEABA36}"/>
+              </a:ext>
+            </a:extLst>
+          </p:cNvPr>
+          <p:cNvSpPr/>
+          <p:nvPr/>
+        </p:nvSpPr>
+        <p:spPr>
+          <a:xfrm>
+            <a:off x="421674" y="2975824"/>
+            <a:ext cx="1102488" cy="906351"/>
+          </a:xfrm>
+          <a:prstGeom prst="rect">
+            <a:avLst/>
+          </a:prstGeom>
+          <a:solidFill>
+            <a:schemeClr val="bg1"/>
+          </a:solidFill>
+          <a:ln>
+            <a:solidFill>
+              <a:schemeClr val="bg1"/>
+            </a:solidFill>
+          </a:ln>
+        </p:spPr>
+        <p:style>
+          <a:lnRef idx="2">
+            <a:schemeClr val="accent1">
+              <a:shade val="50000"/>
+            </a:schemeClr>
+          </a:lnRef>
+          <a:fillRef idx="1">
+            <a:schemeClr val="accent1"/>
+          </a:fillRef>
+          <a:effectRef idx="0">
+            <a:schemeClr val="accent1"/>
+          </a:effectRef>
+          <a:fontRef idx="minor">
+            <a:schemeClr val="lt1"/>
+          </a:fontRef>
+        </p:style>
+        <p:txBody>
+          <a:bodyPr rtlCol="0" anchor="ctr"/>
+          <a:lstStyle/>
+          <a:p>
+            <a:pPr algn="ctr"/>
+            <a:endParaRPr lang="en-GB"/>
+          </a:p>
+        </p:txBody>
+      </p:sp>
     </p:spTree>
     <p:extLst>
       <p:ext uri="{BB962C8B-B14F-4D97-AF65-F5344CB8AC3E}">
@@ -5688,6 +6809,378 @@
           </a:p>
         </p:txBody>
       </p:sp>
+      <p:pic>
+        <p:nvPicPr>
+          <p:cNvPr id="11" name="Picture 10">
+            <a:extLst>
+              <a:ext uri="{FF2B5EF4-FFF2-40B4-BE49-F238E27FC236}">
+                <a16:creationId xmlns:a16="http://schemas.microsoft.com/office/drawing/2014/main" id="{CE72F111-17FC-4C0D-9F27-D5278883CDED}"/>
+              </a:ext>
+            </a:extLst>
+          </p:cNvPr>
+          <p:cNvPicPr>
+            <a:picLocks noChangeAspect="1"/>
+          </p:cNvPicPr>
+          <p:nvPr/>
+        </p:nvPicPr>
+        <p:blipFill>
+          <a:blip r:embed="rId4"/>
+          <a:stretch>
+            <a:fillRect/>
+          </a:stretch>
+        </p:blipFill>
+        <p:spPr>
+          <a:xfrm>
+            <a:off x="9825606" y="1915050"/>
+            <a:ext cx="762000" cy="628650"/>
+          </a:xfrm>
+          <a:prstGeom prst="rect">
+            <a:avLst/>
+          </a:prstGeom>
+        </p:spPr>
+      </p:pic>
+      <p:pic>
+        <p:nvPicPr>
+          <p:cNvPr id="12" name="Picture 11">
+            <a:extLst>
+              <a:ext uri="{FF2B5EF4-FFF2-40B4-BE49-F238E27FC236}">
+                <a16:creationId xmlns:a16="http://schemas.microsoft.com/office/drawing/2014/main" id="{174281FD-39FB-4035-A51B-44D0A9EC6AA3}"/>
+              </a:ext>
+            </a:extLst>
+          </p:cNvPr>
+          <p:cNvPicPr>
+            <a:picLocks noChangeAspect="1"/>
+          </p:cNvPicPr>
+          <p:nvPr/>
+        </p:nvPicPr>
+        <p:blipFill>
+          <a:blip r:embed="rId5"/>
+          <a:stretch>
+            <a:fillRect/>
+          </a:stretch>
+        </p:blipFill>
+        <p:spPr>
+          <a:xfrm>
+            <a:off x="9768456" y="2675100"/>
+            <a:ext cx="876300" cy="704850"/>
+          </a:xfrm>
+          <a:prstGeom prst="rect">
+            <a:avLst/>
+          </a:prstGeom>
+        </p:spPr>
+      </p:pic>
+      <p:pic>
+        <p:nvPicPr>
+          <p:cNvPr id="13" name="Picture 12">
+            <a:extLst>
+              <a:ext uri="{FF2B5EF4-FFF2-40B4-BE49-F238E27FC236}">
+                <a16:creationId xmlns:a16="http://schemas.microsoft.com/office/drawing/2014/main" id="{7D51E477-D56D-4DC6-BE15-7B5F61B51C4C}"/>
+              </a:ext>
+            </a:extLst>
+          </p:cNvPr>
+          <p:cNvPicPr>
+            <a:picLocks noChangeAspect="1"/>
+          </p:cNvPicPr>
+          <p:nvPr/>
+        </p:nvPicPr>
+        <p:blipFill>
+          <a:blip r:embed="rId6"/>
+          <a:stretch>
+            <a:fillRect/>
+          </a:stretch>
+        </p:blipFill>
+        <p:spPr>
+          <a:xfrm>
+            <a:off x="9782743" y="3511350"/>
+            <a:ext cx="847725" cy="581025"/>
+          </a:xfrm>
+          <a:prstGeom prst="rect">
+            <a:avLst/>
+          </a:prstGeom>
+        </p:spPr>
+      </p:pic>
+      <p:pic>
+        <p:nvPicPr>
+          <p:cNvPr id="15" name="Picture 14">
+            <a:extLst>
+              <a:ext uri="{FF2B5EF4-FFF2-40B4-BE49-F238E27FC236}">
+                <a16:creationId xmlns:a16="http://schemas.microsoft.com/office/drawing/2014/main" id="{9C6AA64A-6BF8-4AA2-A888-69ECAFD5D22F}"/>
+              </a:ext>
+            </a:extLst>
+          </p:cNvPr>
+          <p:cNvPicPr>
+            <a:picLocks noChangeAspect="1"/>
+          </p:cNvPicPr>
+          <p:nvPr/>
+        </p:nvPicPr>
+        <p:blipFill>
+          <a:blip r:embed="rId7"/>
+          <a:stretch>
+            <a:fillRect/>
+          </a:stretch>
+        </p:blipFill>
+        <p:spPr>
+          <a:xfrm>
+            <a:off x="9892281" y="4299459"/>
+            <a:ext cx="695325" cy="619125"/>
+          </a:xfrm>
+          <a:prstGeom prst="rect">
+            <a:avLst/>
+          </a:prstGeom>
+        </p:spPr>
+      </p:pic>
+      <p:sp>
+        <p:nvSpPr>
+          <p:cNvPr id="16" name="TextBox 15">
+            <a:extLst>
+              <a:ext uri="{FF2B5EF4-FFF2-40B4-BE49-F238E27FC236}">
+                <a16:creationId xmlns:a16="http://schemas.microsoft.com/office/drawing/2014/main" id="{898FA20A-E1F6-4038-93A7-B6C4FDDD1C45}"/>
+              </a:ext>
+            </a:extLst>
+          </p:cNvPr>
+          <p:cNvSpPr txBox="1"/>
+          <p:nvPr/>
+        </p:nvSpPr>
+        <p:spPr>
+          <a:xfrm>
+            <a:off x="8173616" y="2039761"/>
+            <a:ext cx="1504061" cy="369332"/>
+          </a:xfrm>
+          <a:prstGeom prst="rect">
+            <a:avLst/>
+          </a:prstGeom>
+          <a:noFill/>
+        </p:spPr>
+        <p:txBody>
+          <a:bodyPr wrap="square" rtlCol="0">
+            <a:spAutoFit/>
+          </a:bodyPr>
+          <a:lstStyle/>
+          <a:p>
+            <a:r>
+              <a:rPr lang="en-US" b="1" dirty="0"/>
+              <a:t>round, yellow</a:t>
+            </a:r>
+            <a:endParaRPr lang="en-GB" b="1" dirty="0"/>
+          </a:p>
+        </p:txBody>
+      </p:sp>
+      <p:sp>
+        <p:nvSpPr>
+          <p:cNvPr id="18" name="TextBox 17">
+            <a:extLst>
+              <a:ext uri="{FF2B5EF4-FFF2-40B4-BE49-F238E27FC236}">
+                <a16:creationId xmlns:a16="http://schemas.microsoft.com/office/drawing/2014/main" id="{616D3E42-1605-4E70-A741-E18E8B04A7A0}"/>
+              </a:ext>
+            </a:extLst>
+          </p:cNvPr>
+          <p:cNvSpPr txBox="1"/>
+          <p:nvPr/>
+        </p:nvSpPr>
+        <p:spPr>
+          <a:xfrm>
+            <a:off x="8173616" y="2865060"/>
+            <a:ext cx="1504061" cy="369332"/>
+          </a:xfrm>
+          <a:prstGeom prst="rect">
+            <a:avLst/>
+          </a:prstGeom>
+          <a:noFill/>
+        </p:spPr>
+        <p:txBody>
+          <a:bodyPr wrap="square" rtlCol="0">
+            <a:spAutoFit/>
+          </a:bodyPr>
+          <a:lstStyle/>
+          <a:p>
+            <a:r>
+              <a:rPr lang="en-US" b="1" dirty="0"/>
+              <a:t>round, green</a:t>
+            </a:r>
+            <a:endParaRPr lang="en-GB" b="1" dirty="0"/>
+          </a:p>
+        </p:txBody>
+      </p:sp>
+      <p:sp>
+        <p:nvSpPr>
+          <p:cNvPr id="20" name="TextBox 19">
+            <a:extLst>
+              <a:ext uri="{FF2B5EF4-FFF2-40B4-BE49-F238E27FC236}">
+                <a16:creationId xmlns:a16="http://schemas.microsoft.com/office/drawing/2014/main" id="{0900730A-D129-4B3C-823F-5C8E5D4B83A9}"/>
+              </a:ext>
+            </a:extLst>
+          </p:cNvPr>
+          <p:cNvSpPr txBox="1"/>
+          <p:nvPr/>
+        </p:nvSpPr>
+        <p:spPr>
+          <a:xfrm>
+            <a:off x="8173616" y="3668011"/>
+            <a:ext cx="1819470" cy="369332"/>
+          </a:xfrm>
+          <a:prstGeom prst="rect">
+            <a:avLst/>
+          </a:prstGeom>
+          <a:noFill/>
+        </p:spPr>
+        <p:txBody>
+          <a:bodyPr wrap="square" rtlCol="0">
+            <a:spAutoFit/>
+          </a:bodyPr>
+          <a:lstStyle/>
+          <a:p>
+            <a:r>
+              <a:rPr lang="en-US" b="1" dirty="0"/>
+              <a:t>wrinkled, yellow</a:t>
+            </a:r>
+            <a:endParaRPr lang="en-GB" b="1" dirty="0"/>
+          </a:p>
+        </p:txBody>
+      </p:sp>
+      <p:sp>
+        <p:nvSpPr>
+          <p:cNvPr id="21" name="TextBox 20">
+            <a:extLst>
+              <a:ext uri="{FF2B5EF4-FFF2-40B4-BE49-F238E27FC236}">
+                <a16:creationId xmlns:a16="http://schemas.microsoft.com/office/drawing/2014/main" id="{C6A96424-CF3E-4125-8331-1AC817D64D34}"/>
+              </a:ext>
+            </a:extLst>
+          </p:cNvPr>
+          <p:cNvSpPr txBox="1"/>
+          <p:nvPr/>
+        </p:nvSpPr>
+        <p:spPr>
+          <a:xfrm>
+            <a:off x="8173616" y="4505761"/>
+            <a:ext cx="1819470" cy="369332"/>
+          </a:xfrm>
+          <a:prstGeom prst="rect">
+            <a:avLst/>
+          </a:prstGeom>
+          <a:noFill/>
+        </p:spPr>
+        <p:txBody>
+          <a:bodyPr wrap="square" rtlCol="0">
+            <a:spAutoFit/>
+          </a:bodyPr>
+          <a:lstStyle/>
+          <a:p>
+            <a:r>
+              <a:rPr lang="en-US" b="1" dirty="0"/>
+              <a:t>wrinkled, green</a:t>
+            </a:r>
+            <a:endParaRPr lang="en-GB" b="1" dirty="0"/>
+          </a:p>
+        </p:txBody>
+      </p:sp>
+      <p:sp>
+        <p:nvSpPr>
+          <p:cNvPr id="22" name="Rectangle 21">
+            <a:extLst>
+              <a:ext uri="{FF2B5EF4-FFF2-40B4-BE49-F238E27FC236}">
+                <a16:creationId xmlns:a16="http://schemas.microsoft.com/office/drawing/2014/main" id="{440AB0CB-ECA2-4011-85A0-494A6181876E}"/>
+              </a:ext>
+            </a:extLst>
+          </p:cNvPr>
+          <p:cNvSpPr/>
+          <p:nvPr/>
+        </p:nvSpPr>
+        <p:spPr>
+          <a:xfrm>
+            <a:off x="1812022" y="759934"/>
+            <a:ext cx="2332139" cy="389477"/>
+          </a:xfrm>
+          <a:prstGeom prst="rect">
+            <a:avLst/>
+          </a:prstGeom>
+          <a:solidFill>
+            <a:schemeClr val="bg1"/>
+          </a:solidFill>
+          <a:ln>
+            <a:solidFill>
+              <a:schemeClr val="bg1"/>
+            </a:solidFill>
+          </a:ln>
+        </p:spPr>
+        <p:style>
+          <a:lnRef idx="2">
+            <a:schemeClr val="accent1">
+              <a:shade val="50000"/>
+            </a:schemeClr>
+          </a:lnRef>
+          <a:fillRef idx="1">
+            <a:schemeClr val="accent1"/>
+          </a:fillRef>
+          <a:effectRef idx="0">
+            <a:schemeClr val="accent1"/>
+          </a:effectRef>
+          <a:fontRef idx="minor">
+            <a:schemeClr val="lt1"/>
+          </a:fontRef>
+        </p:style>
+        <p:txBody>
+          <a:bodyPr rtlCol="0" anchor="ctr"/>
+          <a:lstStyle/>
+          <a:p>
+            <a:pPr algn="ctr"/>
+            <a:endParaRPr lang="en-GB"/>
+          </a:p>
+        </p:txBody>
+      </p:sp>
+      <p:sp>
+        <p:nvSpPr>
+          <p:cNvPr id="23" name="Rectangle 22">
+            <a:extLst>
+              <a:ext uri="{FF2B5EF4-FFF2-40B4-BE49-F238E27FC236}">
+                <a16:creationId xmlns:a16="http://schemas.microsoft.com/office/drawing/2014/main" id="{8178E9F5-6DF2-45D8-A4EA-598AE3BE146B}"/>
+              </a:ext>
+            </a:extLst>
+          </p:cNvPr>
+          <p:cNvSpPr/>
+          <p:nvPr/>
+        </p:nvSpPr>
+        <p:spPr>
+          <a:xfrm>
+            <a:off x="421674" y="2975824"/>
+            <a:ext cx="1102488" cy="906351"/>
+          </a:xfrm>
+          <a:prstGeom prst="rect">
+            <a:avLst/>
+          </a:prstGeom>
+          <a:solidFill>
+            <a:schemeClr val="bg1"/>
+          </a:solidFill>
+          <a:ln>
+            <a:solidFill>
+              <a:schemeClr val="bg1"/>
+            </a:solidFill>
+          </a:ln>
+        </p:spPr>
+        <p:style>
+          <a:lnRef idx="2">
+            <a:schemeClr val="accent1">
+              <a:shade val="50000"/>
+            </a:schemeClr>
+          </a:lnRef>
+          <a:fillRef idx="1">
+            <a:schemeClr val="accent1"/>
+          </a:fillRef>
+          <a:effectRef idx="0">
+            <a:schemeClr val="accent1"/>
+          </a:effectRef>
+          <a:fontRef idx="minor">
+            <a:schemeClr val="lt1"/>
+          </a:fontRef>
+        </p:style>
+        <p:txBody>
+          <a:bodyPr rtlCol="0" anchor="ctr"/>
+          <a:lstStyle/>
+          <a:p>
+            <a:pPr algn="ctr"/>
+            <a:endParaRPr lang="en-GB"/>
+          </a:p>
+        </p:txBody>
+      </p:sp>
     </p:spTree>
     <p:extLst>
       <p:ext uri="{BB962C8B-B14F-4D97-AF65-F5344CB8AC3E}">
@@ -6051,6 +7544,378 @@
           </a:solidFill>
           <a:ln w="38100">
             <a:noFill/>
+          </a:ln>
+        </p:spPr>
+        <p:style>
+          <a:lnRef idx="2">
+            <a:schemeClr val="accent1">
+              <a:shade val="50000"/>
+            </a:schemeClr>
+          </a:lnRef>
+          <a:fillRef idx="1">
+            <a:schemeClr val="accent1"/>
+          </a:fillRef>
+          <a:effectRef idx="0">
+            <a:schemeClr val="accent1"/>
+          </a:effectRef>
+          <a:fontRef idx="minor">
+            <a:schemeClr val="lt1"/>
+          </a:fontRef>
+        </p:style>
+        <p:txBody>
+          <a:bodyPr rtlCol="0" anchor="ctr"/>
+          <a:lstStyle/>
+          <a:p>
+            <a:pPr algn="ctr"/>
+            <a:endParaRPr lang="en-GB"/>
+          </a:p>
+        </p:txBody>
+      </p:sp>
+      <p:pic>
+        <p:nvPicPr>
+          <p:cNvPr id="11" name="Picture 10">
+            <a:extLst>
+              <a:ext uri="{FF2B5EF4-FFF2-40B4-BE49-F238E27FC236}">
+                <a16:creationId xmlns:a16="http://schemas.microsoft.com/office/drawing/2014/main" id="{1C40727A-386D-4FF4-8181-47F42A484FED}"/>
+              </a:ext>
+            </a:extLst>
+          </p:cNvPr>
+          <p:cNvPicPr>
+            <a:picLocks noChangeAspect="1"/>
+          </p:cNvPicPr>
+          <p:nvPr/>
+        </p:nvPicPr>
+        <p:blipFill>
+          <a:blip r:embed="rId4"/>
+          <a:stretch>
+            <a:fillRect/>
+          </a:stretch>
+        </p:blipFill>
+        <p:spPr>
+          <a:xfrm>
+            <a:off x="9825606" y="1915050"/>
+            <a:ext cx="762000" cy="628650"/>
+          </a:xfrm>
+          <a:prstGeom prst="rect">
+            <a:avLst/>
+          </a:prstGeom>
+        </p:spPr>
+      </p:pic>
+      <p:pic>
+        <p:nvPicPr>
+          <p:cNvPr id="12" name="Picture 11">
+            <a:extLst>
+              <a:ext uri="{FF2B5EF4-FFF2-40B4-BE49-F238E27FC236}">
+                <a16:creationId xmlns:a16="http://schemas.microsoft.com/office/drawing/2014/main" id="{0B144CA1-BA0F-45DE-A8B9-9972E9498B52}"/>
+              </a:ext>
+            </a:extLst>
+          </p:cNvPr>
+          <p:cNvPicPr>
+            <a:picLocks noChangeAspect="1"/>
+          </p:cNvPicPr>
+          <p:nvPr/>
+        </p:nvPicPr>
+        <p:blipFill>
+          <a:blip r:embed="rId5"/>
+          <a:stretch>
+            <a:fillRect/>
+          </a:stretch>
+        </p:blipFill>
+        <p:spPr>
+          <a:xfrm>
+            <a:off x="9768456" y="2675100"/>
+            <a:ext cx="876300" cy="704850"/>
+          </a:xfrm>
+          <a:prstGeom prst="rect">
+            <a:avLst/>
+          </a:prstGeom>
+        </p:spPr>
+      </p:pic>
+      <p:pic>
+        <p:nvPicPr>
+          <p:cNvPr id="13" name="Picture 12">
+            <a:extLst>
+              <a:ext uri="{FF2B5EF4-FFF2-40B4-BE49-F238E27FC236}">
+                <a16:creationId xmlns:a16="http://schemas.microsoft.com/office/drawing/2014/main" id="{BA1E01AD-7EF1-4F14-8912-0804AFEE64BB}"/>
+              </a:ext>
+            </a:extLst>
+          </p:cNvPr>
+          <p:cNvPicPr>
+            <a:picLocks noChangeAspect="1"/>
+          </p:cNvPicPr>
+          <p:nvPr/>
+        </p:nvPicPr>
+        <p:blipFill>
+          <a:blip r:embed="rId6"/>
+          <a:stretch>
+            <a:fillRect/>
+          </a:stretch>
+        </p:blipFill>
+        <p:spPr>
+          <a:xfrm>
+            <a:off x="9782743" y="3511350"/>
+            <a:ext cx="847725" cy="581025"/>
+          </a:xfrm>
+          <a:prstGeom prst="rect">
+            <a:avLst/>
+          </a:prstGeom>
+        </p:spPr>
+      </p:pic>
+      <p:pic>
+        <p:nvPicPr>
+          <p:cNvPr id="15" name="Picture 14">
+            <a:extLst>
+              <a:ext uri="{FF2B5EF4-FFF2-40B4-BE49-F238E27FC236}">
+                <a16:creationId xmlns:a16="http://schemas.microsoft.com/office/drawing/2014/main" id="{1B402ACA-7A40-49D0-87A4-4694AC786700}"/>
+              </a:ext>
+            </a:extLst>
+          </p:cNvPr>
+          <p:cNvPicPr>
+            <a:picLocks noChangeAspect="1"/>
+          </p:cNvPicPr>
+          <p:nvPr/>
+        </p:nvPicPr>
+        <p:blipFill>
+          <a:blip r:embed="rId7"/>
+          <a:stretch>
+            <a:fillRect/>
+          </a:stretch>
+        </p:blipFill>
+        <p:spPr>
+          <a:xfrm>
+            <a:off x="9892281" y="4299459"/>
+            <a:ext cx="695325" cy="619125"/>
+          </a:xfrm>
+          <a:prstGeom prst="rect">
+            <a:avLst/>
+          </a:prstGeom>
+        </p:spPr>
+      </p:pic>
+      <p:sp>
+        <p:nvSpPr>
+          <p:cNvPr id="16" name="TextBox 15">
+            <a:extLst>
+              <a:ext uri="{FF2B5EF4-FFF2-40B4-BE49-F238E27FC236}">
+                <a16:creationId xmlns:a16="http://schemas.microsoft.com/office/drawing/2014/main" id="{9302BD30-6D55-49CC-9062-72341C1E4D07}"/>
+              </a:ext>
+            </a:extLst>
+          </p:cNvPr>
+          <p:cNvSpPr txBox="1"/>
+          <p:nvPr/>
+        </p:nvSpPr>
+        <p:spPr>
+          <a:xfrm>
+            <a:off x="8173616" y="2039761"/>
+            <a:ext cx="1504061" cy="369332"/>
+          </a:xfrm>
+          <a:prstGeom prst="rect">
+            <a:avLst/>
+          </a:prstGeom>
+          <a:noFill/>
+        </p:spPr>
+        <p:txBody>
+          <a:bodyPr wrap="square" rtlCol="0">
+            <a:spAutoFit/>
+          </a:bodyPr>
+          <a:lstStyle/>
+          <a:p>
+            <a:r>
+              <a:rPr lang="en-US" b="1" dirty="0"/>
+              <a:t>round, yellow</a:t>
+            </a:r>
+            <a:endParaRPr lang="en-GB" b="1" dirty="0"/>
+          </a:p>
+        </p:txBody>
+      </p:sp>
+      <p:sp>
+        <p:nvSpPr>
+          <p:cNvPr id="18" name="TextBox 17">
+            <a:extLst>
+              <a:ext uri="{FF2B5EF4-FFF2-40B4-BE49-F238E27FC236}">
+                <a16:creationId xmlns:a16="http://schemas.microsoft.com/office/drawing/2014/main" id="{0AFCEFD6-0A5A-47FB-BD32-6A1414AD5969}"/>
+              </a:ext>
+            </a:extLst>
+          </p:cNvPr>
+          <p:cNvSpPr txBox="1"/>
+          <p:nvPr/>
+        </p:nvSpPr>
+        <p:spPr>
+          <a:xfrm>
+            <a:off x="8173616" y="2865060"/>
+            <a:ext cx="1504061" cy="369332"/>
+          </a:xfrm>
+          <a:prstGeom prst="rect">
+            <a:avLst/>
+          </a:prstGeom>
+          <a:noFill/>
+        </p:spPr>
+        <p:txBody>
+          <a:bodyPr wrap="square" rtlCol="0">
+            <a:spAutoFit/>
+          </a:bodyPr>
+          <a:lstStyle/>
+          <a:p>
+            <a:r>
+              <a:rPr lang="en-US" b="1" dirty="0"/>
+              <a:t>round, green</a:t>
+            </a:r>
+            <a:endParaRPr lang="en-GB" b="1" dirty="0"/>
+          </a:p>
+        </p:txBody>
+      </p:sp>
+      <p:sp>
+        <p:nvSpPr>
+          <p:cNvPr id="20" name="TextBox 19">
+            <a:extLst>
+              <a:ext uri="{FF2B5EF4-FFF2-40B4-BE49-F238E27FC236}">
+                <a16:creationId xmlns:a16="http://schemas.microsoft.com/office/drawing/2014/main" id="{40BAFF50-27DC-4D7F-86A5-4F092A399642}"/>
+              </a:ext>
+            </a:extLst>
+          </p:cNvPr>
+          <p:cNvSpPr txBox="1"/>
+          <p:nvPr/>
+        </p:nvSpPr>
+        <p:spPr>
+          <a:xfrm>
+            <a:off x="8173616" y="3668011"/>
+            <a:ext cx="1819470" cy="369332"/>
+          </a:xfrm>
+          <a:prstGeom prst="rect">
+            <a:avLst/>
+          </a:prstGeom>
+          <a:noFill/>
+        </p:spPr>
+        <p:txBody>
+          <a:bodyPr wrap="square" rtlCol="0">
+            <a:spAutoFit/>
+          </a:bodyPr>
+          <a:lstStyle/>
+          <a:p>
+            <a:r>
+              <a:rPr lang="en-US" b="1" dirty="0"/>
+              <a:t>wrinkled, yellow</a:t>
+            </a:r>
+            <a:endParaRPr lang="en-GB" b="1" dirty="0"/>
+          </a:p>
+        </p:txBody>
+      </p:sp>
+      <p:sp>
+        <p:nvSpPr>
+          <p:cNvPr id="21" name="TextBox 20">
+            <a:extLst>
+              <a:ext uri="{FF2B5EF4-FFF2-40B4-BE49-F238E27FC236}">
+                <a16:creationId xmlns:a16="http://schemas.microsoft.com/office/drawing/2014/main" id="{FADDD629-93D0-4A08-9F8C-691773CD66D4}"/>
+              </a:ext>
+            </a:extLst>
+          </p:cNvPr>
+          <p:cNvSpPr txBox="1"/>
+          <p:nvPr/>
+        </p:nvSpPr>
+        <p:spPr>
+          <a:xfrm>
+            <a:off x="8173616" y="4505761"/>
+            <a:ext cx="1819470" cy="369332"/>
+          </a:xfrm>
+          <a:prstGeom prst="rect">
+            <a:avLst/>
+          </a:prstGeom>
+          <a:noFill/>
+        </p:spPr>
+        <p:txBody>
+          <a:bodyPr wrap="square" rtlCol="0">
+            <a:spAutoFit/>
+          </a:bodyPr>
+          <a:lstStyle/>
+          <a:p>
+            <a:r>
+              <a:rPr lang="en-US" b="1" dirty="0"/>
+              <a:t>wrinkled, green</a:t>
+            </a:r>
+            <a:endParaRPr lang="en-GB" b="1" dirty="0"/>
+          </a:p>
+        </p:txBody>
+      </p:sp>
+      <p:sp>
+        <p:nvSpPr>
+          <p:cNvPr id="22" name="Rectangle 21">
+            <a:extLst>
+              <a:ext uri="{FF2B5EF4-FFF2-40B4-BE49-F238E27FC236}">
+                <a16:creationId xmlns:a16="http://schemas.microsoft.com/office/drawing/2014/main" id="{06B16155-B6A0-45C9-9D87-F9EFE3D4D9F9}"/>
+              </a:ext>
+            </a:extLst>
+          </p:cNvPr>
+          <p:cNvSpPr/>
+          <p:nvPr/>
+        </p:nvSpPr>
+        <p:spPr>
+          <a:xfrm>
+            <a:off x="1812022" y="759934"/>
+            <a:ext cx="2332139" cy="389477"/>
+          </a:xfrm>
+          <a:prstGeom prst="rect">
+            <a:avLst/>
+          </a:prstGeom>
+          <a:solidFill>
+            <a:schemeClr val="bg1"/>
+          </a:solidFill>
+          <a:ln>
+            <a:solidFill>
+              <a:schemeClr val="bg1"/>
+            </a:solidFill>
+          </a:ln>
+        </p:spPr>
+        <p:style>
+          <a:lnRef idx="2">
+            <a:schemeClr val="accent1">
+              <a:shade val="50000"/>
+            </a:schemeClr>
+          </a:lnRef>
+          <a:fillRef idx="1">
+            <a:schemeClr val="accent1"/>
+          </a:fillRef>
+          <a:effectRef idx="0">
+            <a:schemeClr val="accent1"/>
+          </a:effectRef>
+          <a:fontRef idx="minor">
+            <a:schemeClr val="lt1"/>
+          </a:fontRef>
+        </p:style>
+        <p:txBody>
+          <a:bodyPr rtlCol="0" anchor="ctr"/>
+          <a:lstStyle/>
+          <a:p>
+            <a:pPr algn="ctr"/>
+            <a:endParaRPr lang="en-GB"/>
+          </a:p>
+        </p:txBody>
+      </p:sp>
+      <p:sp>
+        <p:nvSpPr>
+          <p:cNvPr id="23" name="Rectangle 22">
+            <a:extLst>
+              <a:ext uri="{FF2B5EF4-FFF2-40B4-BE49-F238E27FC236}">
+                <a16:creationId xmlns:a16="http://schemas.microsoft.com/office/drawing/2014/main" id="{565F5E9C-E57D-4190-89DD-2B496EE24009}"/>
+              </a:ext>
+            </a:extLst>
+          </p:cNvPr>
+          <p:cNvSpPr/>
+          <p:nvPr/>
+        </p:nvSpPr>
+        <p:spPr>
+          <a:xfrm>
+            <a:off x="421674" y="2975824"/>
+            <a:ext cx="1102488" cy="906351"/>
+          </a:xfrm>
+          <a:prstGeom prst="rect">
+            <a:avLst/>
+          </a:prstGeom>
+          <a:solidFill>
+            <a:schemeClr val="bg1"/>
+          </a:solidFill>
+          <a:ln>
+            <a:solidFill>
+              <a:schemeClr val="bg1"/>
+            </a:solidFill>
           </a:ln>
         </p:spPr>
         <p:style>

</xml_diff>